<commit_message>
error fixed in formalization of participation
</commit_message>
<xml_diff>
--- a/docs/2013_BFO2_Freiburg.pptx
+++ b/docs/2013_BFO2_Freiburg.pptx
@@ -210,7 +210,7 @@
           <a:p>
             <a:fld id="{E90BAE72-EEF7-411D-8AEC-FCFBA5673AC6}" type="datetimeFigureOut">
               <a:rPr lang="en-US" smtClean="0"/>
-              <a:t>10/21/2013</a:t>
+              <a:t>10/24/2013</a:t>
             </a:fld>
             <a:endParaRPr lang="en-US"/>
           </a:p>
@@ -828,7 +828,7 @@
             <a:fld id="{92E4E5A9-7278-4B84-9E31-90610B320254}" type="datetimeFigureOut">
               <a:rPr lang="de-DE" smtClean="0"/>
               <a:pPr/>
-              <a:t>21.10.2013</a:t>
+              <a:t>24.10.2013</a:t>
             </a:fld>
             <a:endParaRPr lang="de-DE"/>
           </a:p>
@@ -995,7 +995,7 @@
             <a:fld id="{92E4E5A9-7278-4B84-9E31-90610B320254}" type="datetimeFigureOut">
               <a:rPr lang="de-DE" smtClean="0"/>
               <a:pPr/>
-              <a:t>21.10.2013</a:t>
+              <a:t>24.10.2013</a:t>
             </a:fld>
             <a:endParaRPr lang="de-DE"/>
           </a:p>
@@ -1172,7 +1172,7 @@
             <a:fld id="{92E4E5A9-7278-4B84-9E31-90610B320254}" type="datetimeFigureOut">
               <a:rPr lang="de-DE" smtClean="0"/>
               <a:pPr/>
-              <a:t>21.10.2013</a:t>
+              <a:t>24.10.2013</a:t>
             </a:fld>
             <a:endParaRPr lang="de-DE"/>
           </a:p>
@@ -1339,7 +1339,7 @@
             <a:fld id="{92E4E5A9-7278-4B84-9E31-90610B320254}" type="datetimeFigureOut">
               <a:rPr lang="de-DE" smtClean="0"/>
               <a:pPr/>
-              <a:t>21.10.2013</a:t>
+              <a:t>24.10.2013</a:t>
             </a:fld>
             <a:endParaRPr lang="de-DE"/>
           </a:p>
@@ -1582,7 +1582,7 @@
             <a:fld id="{92E4E5A9-7278-4B84-9E31-90610B320254}" type="datetimeFigureOut">
               <a:rPr lang="de-DE" smtClean="0"/>
               <a:pPr/>
-              <a:t>21.10.2013</a:t>
+              <a:t>24.10.2013</a:t>
             </a:fld>
             <a:endParaRPr lang="de-DE"/>
           </a:p>
@@ -1867,7 +1867,7 @@
             <a:fld id="{92E4E5A9-7278-4B84-9E31-90610B320254}" type="datetimeFigureOut">
               <a:rPr lang="de-DE" smtClean="0"/>
               <a:pPr/>
-              <a:t>21.10.2013</a:t>
+              <a:t>24.10.2013</a:t>
             </a:fld>
             <a:endParaRPr lang="de-DE"/>
           </a:p>
@@ -2286,7 +2286,7 @@
             <a:fld id="{92E4E5A9-7278-4B84-9E31-90610B320254}" type="datetimeFigureOut">
               <a:rPr lang="de-DE" smtClean="0"/>
               <a:pPr/>
-              <a:t>21.10.2013</a:t>
+              <a:t>24.10.2013</a:t>
             </a:fld>
             <a:endParaRPr lang="de-DE"/>
           </a:p>
@@ -2401,7 +2401,7 @@
             <a:fld id="{92E4E5A9-7278-4B84-9E31-90610B320254}" type="datetimeFigureOut">
               <a:rPr lang="de-DE" smtClean="0"/>
               <a:pPr/>
-              <a:t>21.10.2013</a:t>
+              <a:t>24.10.2013</a:t>
             </a:fld>
             <a:endParaRPr lang="de-DE"/>
           </a:p>
@@ -2493,7 +2493,7 @@
             <a:fld id="{92E4E5A9-7278-4B84-9E31-90610B320254}" type="datetimeFigureOut">
               <a:rPr lang="de-DE" smtClean="0"/>
               <a:pPr/>
-              <a:t>21.10.2013</a:t>
+              <a:t>24.10.2013</a:t>
             </a:fld>
             <a:endParaRPr lang="de-DE"/>
           </a:p>
@@ -2767,7 +2767,7 @@
             <a:fld id="{92E4E5A9-7278-4B84-9E31-90610B320254}" type="datetimeFigureOut">
               <a:rPr lang="de-DE" smtClean="0"/>
               <a:pPr/>
-              <a:t>21.10.2013</a:t>
+              <a:t>24.10.2013</a:t>
             </a:fld>
             <a:endParaRPr lang="de-DE"/>
           </a:p>
@@ -3017,7 +3017,7 @@
             <a:fld id="{92E4E5A9-7278-4B84-9E31-90610B320254}" type="datetimeFigureOut">
               <a:rPr lang="de-DE" smtClean="0"/>
               <a:pPr/>
-              <a:t>21.10.2013</a:t>
+              <a:t>24.10.2013</a:t>
             </a:fld>
             <a:endParaRPr lang="de-DE"/>
           </a:p>
@@ -3227,7 +3227,7 @@
             <a:fld id="{92E4E5A9-7278-4B84-9E31-90610B320254}" type="datetimeFigureOut">
               <a:rPr lang="de-DE" smtClean="0"/>
               <a:pPr/>
-              <a:t>21.10.2013</a:t>
+              <a:t>24.10.2013</a:t>
             </a:fld>
             <a:endParaRPr lang="de-DE"/>
           </a:p>
@@ -3735,7 +3735,40 @@
                   </a:schemeClr>
                 </a:solidFill>
               </a:rPr>
-              <a:t>Freiburg, 10 Oct 2013</a:t>
+              <a:t>Freiburg</a:t>
+            </a:r>
+            <a:r>
+              <a:rPr lang="en-GB" smtClean="0">
+                <a:solidFill>
+                  <a:schemeClr val="tx1">
+                    <a:lumMod val="50000"/>
+                    <a:lumOff val="50000"/>
+                  </a:schemeClr>
+                </a:solidFill>
+              </a:rPr>
+              <a:t>, </a:t>
+            </a:r>
+            <a:r>
+              <a:rPr lang="en-GB" smtClean="0">
+                <a:solidFill>
+                  <a:schemeClr val="tx1">
+                    <a:lumMod val="50000"/>
+                    <a:lumOff val="50000"/>
+                  </a:schemeClr>
+                </a:solidFill>
+              </a:rPr>
+              <a:t>24 </a:t>
+            </a:r>
+            <a:r>
+              <a:rPr lang="en-GB" dirty="0" smtClean="0">
+                <a:solidFill>
+                  <a:schemeClr val="tx1">
+                    <a:lumMod val="50000"/>
+                    <a:lumOff val="50000"/>
+                  </a:schemeClr>
+                </a:solidFill>
+              </a:rPr>
+              <a:t>Oct 2013</a:t>
             </a:r>
             <a:endParaRPr lang="en-GB" dirty="0">
               <a:solidFill>
@@ -12204,7 +12237,7 @@
         </p:spPr>
         <p:txBody>
           <a:bodyPr>
-            <a:normAutofit lnSpcReduction="10000"/>
+            <a:normAutofit fontScale="92500"/>
           </a:bodyPr>
           <a:lstStyle/>
           <a:p>
@@ -12645,7 +12678,7 @@
                 <a:cs typeface="Times New Roman" pitchFamily="18" charset="0"/>
                 <a:sym typeface="Wingdings" pitchFamily="2" charset="2"/>
               </a:rPr>
-              <a:t>subClassOf </a:t>
+              <a:t>subClassOf (</a:t>
             </a:r>
             <a:r>
               <a:rPr lang="en-GB" sz="2400" b="1" dirty="0" err="1" smtClean="0">
@@ -12656,6 +12689,28 @@
                 <a:cs typeface="Times New Roman" pitchFamily="18" charset="0"/>
                 <a:sym typeface="Wingdings" pitchFamily="2" charset="2"/>
               </a:rPr>
+              <a:t>atSomeTime</a:t>
+            </a:r>
+            <a:r>
+              <a:rPr lang="en-GB" sz="2400" dirty="0" smtClean="0">
+                <a:solidFill>
+                  <a:schemeClr val="tx2"/>
+                </a:solidFill>
+                <a:latin typeface="Times New Roman" pitchFamily="18" charset="0"/>
+                <a:cs typeface="Times New Roman" pitchFamily="18" charset="0"/>
+                <a:sym typeface="Wingdings" pitchFamily="2" charset="2"/>
+              </a:rPr>
+              <a:t> some (</a:t>
+            </a:r>
+            <a:r>
+              <a:rPr lang="en-GB" sz="2400" b="1" dirty="0" err="1" smtClean="0">
+                <a:solidFill>
+                  <a:schemeClr val="tx2"/>
+                </a:solidFill>
+                <a:latin typeface="Times New Roman" pitchFamily="18" charset="0"/>
+                <a:cs typeface="Times New Roman" pitchFamily="18" charset="0"/>
+                <a:sym typeface="Wingdings" pitchFamily="2" charset="2"/>
+              </a:rPr>
               <a:t>participatesIn</a:t>
             </a:r>
             <a:r>
@@ -12690,6 +12745,17 @@
                 <a:sym typeface="Wingdings" pitchFamily="2" charset="2"/>
               </a:rPr>
               <a:t>BirthProcess</a:t>
+            </a:r>
+            <a:r>
+              <a:rPr lang="en-GB" sz="2400" i="1" dirty="0" smtClean="0">
+                <a:solidFill>
+                  <a:schemeClr val="tx2"/>
+                </a:solidFill>
+                <a:latin typeface="Times New Roman" pitchFamily="18" charset="0"/>
+                <a:cs typeface="Times New Roman" pitchFamily="18" charset="0"/>
+                <a:sym typeface="Wingdings" pitchFamily="2" charset="2"/>
+              </a:rPr>
+              <a:t>))</a:t>
             </a:r>
             <a:endParaRPr lang="en-GB" sz="2400" i="1" dirty="0">
               <a:solidFill>

</xml_diff>

<commit_message>
four slides added regarding temporal granularity and TQC
</commit_message>
<xml_diff>
--- a/docs/2013_BFO2_Freiburg.pptx
+++ b/docs/2013_BFO2_Freiburg.pptx
@@ -5,7 +5,7 @@
     <p:sldMasterId id="2147483648" r:id="rId1"/>
   </p:sldMasterIdLst>
   <p:notesMasterIdLst>
-    <p:notesMasterId r:id="rId21"/>
+    <p:notesMasterId r:id="rId25"/>
   </p:notesMasterIdLst>
   <p:sldIdLst>
     <p:sldId id="256" r:id="rId2"/>
@@ -27,6 +27,10 @@
     <p:sldId id="297" r:id="rId18"/>
     <p:sldId id="298" r:id="rId19"/>
     <p:sldId id="299" r:id="rId20"/>
+    <p:sldId id="301" r:id="rId21"/>
+    <p:sldId id="303" r:id="rId22"/>
+    <p:sldId id="304" r:id="rId23"/>
+    <p:sldId id="305" r:id="rId24"/>
   </p:sldIdLst>
   <p:sldSz cx="9144000" cy="6858000" type="screen4x3"/>
   <p:notesSz cx="6858000" cy="9144000"/>
@@ -210,7 +214,7 @@
           <a:p>
             <a:fld id="{E90BAE72-EEF7-411D-8AEC-FCFBA5673AC6}" type="datetimeFigureOut">
               <a:rPr lang="en-US" smtClean="0"/>
-              <a:t>10/24/2013</a:t>
+              <a:t>10/25/2013</a:t>
             </a:fld>
             <a:endParaRPr lang="en-US"/>
           </a:p>
@@ -828,7 +832,7 @@
             <a:fld id="{92E4E5A9-7278-4B84-9E31-90610B320254}" type="datetimeFigureOut">
               <a:rPr lang="de-DE" smtClean="0"/>
               <a:pPr/>
-              <a:t>24.10.2013</a:t>
+              <a:t>25.10.2013</a:t>
             </a:fld>
             <a:endParaRPr lang="de-DE"/>
           </a:p>
@@ -995,7 +999,7 @@
             <a:fld id="{92E4E5A9-7278-4B84-9E31-90610B320254}" type="datetimeFigureOut">
               <a:rPr lang="de-DE" smtClean="0"/>
               <a:pPr/>
-              <a:t>24.10.2013</a:t>
+              <a:t>25.10.2013</a:t>
             </a:fld>
             <a:endParaRPr lang="de-DE"/>
           </a:p>
@@ -1172,7 +1176,7 @@
             <a:fld id="{92E4E5A9-7278-4B84-9E31-90610B320254}" type="datetimeFigureOut">
               <a:rPr lang="de-DE" smtClean="0"/>
               <a:pPr/>
-              <a:t>24.10.2013</a:t>
+              <a:t>25.10.2013</a:t>
             </a:fld>
             <a:endParaRPr lang="de-DE"/>
           </a:p>
@@ -1339,7 +1343,7 @@
             <a:fld id="{92E4E5A9-7278-4B84-9E31-90610B320254}" type="datetimeFigureOut">
               <a:rPr lang="de-DE" smtClean="0"/>
               <a:pPr/>
-              <a:t>24.10.2013</a:t>
+              <a:t>25.10.2013</a:t>
             </a:fld>
             <a:endParaRPr lang="de-DE"/>
           </a:p>
@@ -1582,7 +1586,7 @@
             <a:fld id="{92E4E5A9-7278-4B84-9E31-90610B320254}" type="datetimeFigureOut">
               <a:rPr lang="de-DE" smtClean="0"/>
               <a:pPr/>
-              <a:t>24.10.2013</a:t>
+              <a:t>25.10.2013</a:t>
             </a:fld>
             <a:endParaRPr lang="de-DE"/>
           </a:p>
@@ -1867,7 +1871,7 @@
             <a:fld id="{92E4E5A9-7278-4B84-9E31-90610B320254}" type="datetimeFigureOut">
               <a:rPr lang="de-DE" smtClean="0"/>
               <a:pPr/>
-              <a:t>24.10.2013</a:t>
+              <a:t>25.10.2013</a:t>
             </a:fld>
             <a:endParaRPr lang="de-DE"/>
           </a:p>
@@ -2286,7 +2290,7 @@
             <a:fld id="{92E4E5A9-7278-4B84-9E31-90610B320254}" type="datetimeFigureOut">
               <a:rPr lang="de-DE" smtClean="0"/>
               <a:pPr/>
-              <a:t>24.10.2013</a:t>
+              <a:t>25.10.2013</a:t>
             </a:fld>
             <a:endParaRPr lang="de-DE"/>
           </a:p>
@@ -2401,7 +2405,7 @@
             <a:fld id="{92E4E5A9-7278-4B84-9E31-90610B320254}" type="datetimeFigureOut">
               <a:rPr lang="de-DE" smtClean="0"/>
               <a:pPr/>
-              <a:t>24.10.2013</a:t>
+              <a:t>25.10.2013</a:t>
             </a:fld>
             <a:endParaRPr lang="de-DE"/>
           </a:p>
@@ -2493,7 +2497,7 @@
             <a:fld id="{92E4E5A9-7278-4B84-9E31-90610B320254}" type="datetimeFigureOut">
               <a:rPr lang="de-DE" smtClean="0"/>
               <a:pPr/>
-              <a:t>24.10.2013</a:t>
+              <a:t>25.10.2013</a:t>
             </a:fld>
             <a:endParaRPr lang="de-DE"/>
           </a:p>
@@ -2767,7 +2771,7 @@
             <a:fld id="{92E4E5A9-7278-4B84-9E31-90610B320254}" type="datetimeFigureOut">
               <a:rPr lang="de-DE" smtClean="0"/>
               <a:pPr/>
-              <a:t>24.10.2013</a:t>
+              <a:t>25.10.2013</a:t>
             </a:fld>
             <a:endParaRPr lang="de-DE"/>
           </a:p>
@@ -3017,7 +3021,7 @@
             <a:fld id="{92E4E5A9-7278-4B84-9E31-90610B320254}" type="datetimeFigureOut">
               <a:rPr lang="de-DE" smtClean="0"/>
               <a:pPr/>
-              <a:t>24.10.2013</a:t>
+              <a:t>25.10.2013</a:t>
             </a:fld>
             <a:endParaRPr lang="de-DE"/>
           </a:p>
@@ -3122,10 +3126,10 @@
           <a:lstStyle/>
           <a:p>
             <a:r>
-              <a:rPr lang="de-DE" smtClean="0"/>
+              <a:rPr lang="en-GB" noProof="0" smtClean="0"/>
               <a:t>Titelmasterformat durch Klicken bearbeiten</a:t>
             </a:r>
-            <a:endParaRPr lang="de-DE"/>
+            <a:endParaRPr lang="en-GB" noProof="0"/>
           </a:p>
         </p:txBody>
       </p:sp>
@@ -3156,38 +3160,38 @@
           <a:p>
             <a:pPr lvl="0"/>
             <a:r>
-              <a:rPr lang="de-DE" smtClean="0"/>
+              <a:rPr lang="en-GB" noProof="0" smtClean="0"/>
               <a:t>Textmasterformate durch Klicken bearbeiten</a:t>
             </a:r>
           </a:p>
           <a:p>
             <a:pPr lvl="1"/>
             <a:r>
-              <a:rPr lang="de-DE" smtClean="0"/>
+              <a:rPr lang="en-GB" noProof="0" smtClean="0"/>
               <a:t>Zweite Ebene</a:t>
             </a:r>
           </a:p>
           <a:p>
             <a:pPr lvl="2"/>
             <a:r>
-              <a:rPr lang="de-DE" smtClean="0"/>
+              <a:rPr lang="en-GB" noProof="0" smtClean="0"/>
               <a:t>Dritte Ebene</a:t>
             </a:r>
           </a:p>
           <a:p>
             <a:pPr lvl="3"/>
             <a:r>
-              <a:rPr lang="de-DE" smtClean="0"/>
+              <a:rPr lang="en-GB" noProof="0" smtClean="0"/>
               <a:t>Vierte Ebene</a:t>
             </a:r>
           </a:p>
           <a:p>
             <a:pPr lvl="4"/>
             <a:r>
-              <a:rPr lang="de-DE" smtClean="0"/>
+              <a:rPr lang="en-GB" noProof="0" smtClean="0"/>
               <a:t>Fünfte Ebene</a:t>
             </a:r>
-            <a:endParaRPr lang="de-DE"/>
+            <a:endParaRPr lang="en-GB" noProof="0"/>
           </a:p>
         </p:txBody>
       </p:sp>
@@ -3225,11 +3229,11 @@
           </a:lstStyle>
           <a:p>
             <a:fld id="{92E4E5A9-7278-4B84-9E31-90610B320254}" type="datetimeFigureOut">
-              <a:rPr lang="de-DE" smtClean="0"/>
+              <a:rPr lang="en-GB" noProof="0" smtClean="0"/>
               <a:pPr/>
-              <a:t>24.10.2013</a:t>
+              <a:t>25.10.2013</a:t>
             </a:fld>
-            <a:endParaRPr lang="de-DE"/>
+            <a:endParaRPr lang="en-GB" noProof="0"/>
           </a:p>
         </p:txBody>
       </p:sp>
@@ -3266,7 +3270,7 @@
             </a:lvl1pPr>
           </a:lstStyle>
           <a:p>
-            <a:endParaRPr lang="de-DE"/>
+            <a:endParaRPr lang="en-GB" noProof="0"/>
           </a:p>
         </p:txBody>
       </p:sp>
@@ -3304,11 +3308,11 @@
           </a:lstStyle>
           <a:p>
             <a:fld id="{D6823F67-A723-4E0B-B5FB-711226A046FD}" type="slidenum">
-              <a:rPr lang="de-DE" smtClean="0"/>
+              <a:rPr lang="en-GB" noProof="0" smtClean="0"/>
               <a:pPr/>
               <a:t>‹Nr.›</a:t>
             </a:fld>
-            <a:endParaRPr lang="de-DE"/>
+            <a:endParaRPr lang="en-GB" noProof="0"/>
           </a:p>
         </p:txBody>
       </p:sp>
@@ -3735,29 +3739,7 @@
                   </a:schemeClr>
                 </a:solidFill>
               </a:rPr>
-              <a:t>Freiburg</a:t>
-            </a:r>
-            <a:r>
-              <a:rPr lang="en-GB" smtClean="0">
-                <a:solidFill>
-                  <a:schemeClr val="tx1">
-                    <a:lumMod val="50000"/>
-                    <a:lumOff val="50000"/>
-                  </a:schemeClr>
-                </a:solidFill>
-              </a:rPr>
-              <a:t>, </a:t>
-            </a:r>
-            <a:r>
-              <a:rPr lang="en-GB" smtClean="0">
-                <a:solidFill>
-                  <a:schemeClr val="tx1">
-                    <a:lumMod val="50000"/>
-                    <a:lumOff val="50000"/>
-                  </a:schemeClr>
-                </a:solidFill>
-              </a:rPr>
-              <a:t>24 </a:t>
+              <a:t>25 </a:t>
             </a:r>
             <a:r>
               <a:rPr lang="en-GB" dirty="0" smtClean="0">
@@ -14030,6 +14012,1175 @@
       </p:par>
     </p:tnLst>
   </p:timing>
+</p:sld>
+</file>
+
+<file path=ppt/slides/slide20.xml><?xml version="1.0" encoding="utf-8"?>
+<p:sld xmlns:a="http://schemas.openxmlformats.org/drawingml/2006/main" xmlns:r="http://schemas.openxmlformats.org/officeDocument/2006/relationships" xmlns:p="http://schemas.openxmlformats.org/presentationml/2006/main">
+  <p:cSld>
+    <p:spTree>
+      <p:nvGrpSpPr>
+        <p:cNvPr id="1" name=""/>
+        <p:cNvGrpSpPr/>
+        <p:nvPr/>
+      </p:nvGrpSpPr>
+      <p:grpSpPr>
+        <a:xfrm>
+          <a:off x="0" y="0"/>
+          <a:ext cx="0" cy="0"/>
+          <a:chOff x="0" y="0"/>
+          <a:chExt cx="0" cy="0"/>
+        </a:xfrm>
+      </p:grpSpPr>
+      <p:sp>
+        <p:nvSpPr>
+          <p:cNvPr id="2" name="Titel 1"/>
+          <p:cNvSpPr>
+            <a:spLocks noGrp="1"/>
+          </p:cNvSpPr>
+          <p:nvPr>
+            <p:ph type="title"/>
+          </p:nvPr>
+        </p:nvSpPr>
+        <p:spPr>
+          <a:xfrm>
+            <a:off x="457200" y="44624"/>
+            <a:ext cx="8229600" cy="1143000"/>
+          </a:xfrm>
+        </p:spPr>
+        <p:txBody>
+          <a:bodyPr>
+            <a:normAutofit/>
+          </a:bodyPr>
+          <a:lstStyle/>
+          <a:p>
+            <a:r>
+              <a:rPr lang="en-GB" sz="3600" dirty="0" smtClean="0"/>
+              <a:t>TQCs and temporal granularity</a:t>
+            </a:r>
+            <a:endParaRPr lang="en-GB" sz="3600" dirty="0"/>
+          </a:p>
+        </p:txBody>
+      </p:sp>
+      <p:sp>
+        <p:nvSpPr>
+          <p:cNvPr id="3" name="Inhaltsplatzhalter 2"/>
+          <p:cNvSpPr>
+            <a:spLocks noGrp="1"/>
+          </p:cNvSpPr>
+          <p:nvPr>
+            <p:ph idx="1"/>
+          </p:nvPr>
+        </p:nvSpPr>
+        <p:spPr>
+          <a:xfrm>
+            <a:off x="457200" y="1268760"/>
+            <a:ext cx="8435280" cy="5328592"/>
+          </a:xfrm>
+        </p:spPr>
+        <p:txBody>
+          <a:bodyPr>
+            <a:noAutofit/>
+          </a:bodyPr>
+          <a:lstStyle/>
+          <a:p>
+            <a:r>
+              <a:rPr lang="en-GB" sz="2400" dirty="0" smtClean="0"/>
+              <a:t>Problem: </a:t>
+            </a:r>
+            <a:br>
+              <a:rPr lang="en-GB" sz="2400" dirty="0" smtClean="0"/>
+            </a:br>
+            <a:r>
+              <a:rPr lang="en-GB" sz="2400" dirty="0" smtClean="0"/>
+              <a:t>if we have spatially extended temporal regions, there may be competing temporal interpretations of relations between TQCs</a:t>
+            </a:r>
+          </a:p>
+          <a:p>
+            <a:r>
+              <a:rPr lang="en-GB" sz="2400" dirty="0" smtClean="0"/>
+              <a:t>Example: I am now in Mannheim, e.g.</a:t>
+            </a:r>
+            <a:br>
+              <a:rPr lang="en-GB" sz="2400" dirty="0" smtClean="0"/>
+            </a:br>
+            <a:r>
+              <a:rPr lang="en-GB" sz="2400" b="1" dirty="0" smtClean="0"/>
+              <a:t>Mannheim@201310251400 </a:t>
+            </a:r>
+            <a:r>
+              <a:rPr lang="en-GB" sz="2400" b="1" dirty="0" err="1" smtClean="0"/>
+              <a:t>locationOf</a:t>
+            </a:r>
+            <a:r>
+              <a:rPr lang="en-GB" sz="2400" b="1" dirty="0" smtClean="0"/>
+              <a:t> Stefan@201310251400</a:t>
+            </a:r>
+          </a:p>
+          <a:p>
+            <a:r>
+              <a:rPr lang="en-GB" sz="2400" dirty="0" smtClean="0"/>
+              <a:t>But what about less granular temporal regions like</a:t>
+            </a:r>
+          </a:p>
+          <a:p>
+            <a:pPr lvl="1"/>
+            <a:r>
+              <a:rPr lang="en-GB" sz="1800" b="1" dirty="0" smtClean="0"/>
+              <a:t>Mannheim@20131025 </a:t>
+            </a:r>
+            <a:r>
+              <a:rPr lang="en-GB" sz="1800" b="1" dirty="0" err="1"/>
+              <a:t>locationOf</a:t>
+            </a:r>
+            <a:r>
+              <a:rPr lang="en-GB" sz="1800" b="1" dirty="0"/>
+              <a:t> </a:t>
+            </a:r>
+            <a:r>
+              <a:rPr lang="en-GB" sz="1800" b="1" dirty="0" smtClean="0"/>
+              <a:t>Stefan@201310201425</a:t>
+            </a:r>
+          </a:p>
+          <a:p>
+            <a:pPr lvl="1"/>
+            <a:r>
+              <a:rPr lang="en-GB" sz="1800" b="1" dirty="0" smtClean="0"/>
+              <a:t>Mannheim@2013 </a:t>
+            </a:r>
+            <a:r>
+              <a:rPr lang="en-GB" sz="1800" b="1" dirty="0" err="1"/>
+              <a:t>locationOf</a:t>
+            </a:r>
+            <a:r>
+              <a:rPr lang="en-GB" sz="1800" b="1" dirty="0"/>
+              <a:t> </a:t>
+            </a:r>
+            <a:r>
+              <a:rPr lang="en-GB" sz="1800" b="1" dirty="0" smtClean="0"/>
+              <a:t>Stefan@2013</a:t>
+            </a:r>
+            <a:r>
+              <a:rPr lang="en-GB" sz="1800" dirty="0" smtClean="0"/>
+              <a:t/>
+            </a:r>
+            <a:br>
+              <a:rPr lang="en-GB" sz="1800" dirty="0" smtClean="0"/>
+            </a:br>
+            <a:r>
+              <a:rPr lang="en-GB" sz="1800" dirty="0" smtClean="0"/>
+              <a:t>If the latter also holds, then </a:t>
+            </a:r>
+            <a:r>
+              <a:rPr lang="en-GB" sz="1800" b="1" dirty="0" smtClean="0"/>
+              <a:t>Graz@2013 </a:t>
+            </a:r>
+            <a:r>
+              <a:rPr lang="en-GB" sz="1800" b="1" dirty="0" err="1"/>
+              <a:t>locationOf</a:t>
+            </a:r>
+            <a:r>
+              <a:rPr lang="en-GB" sz="1800" b="1" dirty="0"/>
+              <a:t> </a:t>
+            </a:r>
+            <a:r>
+              <a:rPr lang="en-GB" sz="1800" b="1" dirty="0" smtClean="0"/>
+              <a:t>Stefan@2013</a:t>
+            </a:r>
+            <a:r>
+              <a:rPr lang="en-GB" sz="1800" dirty="0" smtClean="0"/>
+              <a:t> would be equally true, but it would conflict with the (plausible) axiom</a:t>
+            </a:r>
+            <a:br>
+              <a:rPr lang="en-GB" sz="1800" dirty="0" smtClean="0"/>
+            </a:br>
+            <a:r>
+              <a:rPr lang="en-GB" sz="1800" b="1" dirty="0" smtClean="0"/>
+              <a:t>Graz@2013</a:t>
+            </a:r>
+            <a:r>
+              <a:rPr lang="en-GB" sz="1800" dirty="0" smtClean="0"/>
+              <a:t> type </a:t>
+            </a:r>
+            <a:r>
+              <a:rPr lang="en-US" sz="1800" dirty="0" smtClean="0"/>
+              <a:t>not </a:t>
+            </a:r>
+            <a:r>
+              <a:rPr lang="en-US" sz="1800" dirty="0"/>
+              <a:t>('</a:t>
+            </a:r>
+            <a:r>
+              <a:rPr lang="en-US" sz="1800" b="1" dirty="0"/>
+              <a:t>location of</a:t>
+            </a:r>
+            <a:r>
+              <a:rPr lang="en-US" sz="1800" dirty="0"/>
+              <a:t>' some ('</a:t>
+            </a:r>
+            <a:r>
+              <a:rPr lang="en-US" sz="1800" b="1" dirty="0"/>
+              <a:t>located in</a:t>
+            </a:r>
+            <a:r>
+              <a:rPr lang="en-US" sz="1800" dirty="0"/>
+              <a:t>' value </a:t>
+            </a:r>
+            <a:r>
+              <a:rPr lang="en-US" sz="1800" b="1" dirty="0" smtClean="0"/>
+              <a:t>Mannheim@2013</a:t>
+            </a:r>
+            <a:r>
+              <a:rPr lang="en-US" sz="1800" dirty="0" smtClean="0"/>
+              <a:t>))</a:t>
+            </a:r>
+          </a:p>
+          <a:p>
+            <a:r>
+              <a:rPr lang="en-US" sz="2400" dirty="0" smtClean="0"/>
+              <a:t>What if the temporal span of a TQC instance is not included in the span covered by its "max"?, e.g.</a:t>
+            </a:r>
+          </a:p>
+          <a:p>
+            <a:pPr lvl="1"/>
+            <a:r>
+              <a:rPr lang="en-US" sz="1800" b="1" dirty="0" smtClean="0"/>
+              <a:t>Mannheim@21thCentury</a:t>
+            </a:r>
+            <a:r>
+              <a:rPr lang="en-US" sz="1800" dirty="0" smtClean="0"/>
+              <a:t> </a:t>
+            </a:r>
+            <a:r>
+              <a:rPr lang="en-GB" sz="1800" b="1" dirty="0" err="1"/>
+              <a:t>locationOf</a:t>
+            </a:r>
+            <a:r>
+              <a:rPr lang="en-GB" sz="1800" b="1" dirty="0"/>
+              <a:t> </a:t>
+            </a:r>
+            <a:r>
+              <a:rPr lang="en-GB" sz="1800" b="1" dirty="0" smtClean="0"/>
+              <a:t>Stefan@</a:t>
+            </a:r>
+            <a:r>
+              <a:rPr lang="en-US" sz="1800" b="1" dirty="0" smtClean="0"/>
+              <a:t>21thCentury  </a:t>
+            </a:r>
+          </a:p>
+          <a:p>
+            <a:pPr marL="457200" lvl="1" indent="0">
+              <a:buNone/>
+            </a:pPr>
+            <a:r>
+              <a:rPr lang="en-GB" sz="1800" dirty="0"/>
+              <a:t/>
+            </a:r>
+            <a:br>
+              <a:rPr lang="en-GB" sz="1800" dirty="0"/>
+            </a:br>
+            <a:r>
+              <a:rPr lang="en-GB" sz="1800" dirty="0" smtClean="0"/>
+              <a:t/>
+            </a:r>
+            <a:br>
+              <a:rPr lang="en-GB" sz="1800" dirty="0" smtClean="0"/>
+            </a:br>
+            <a:r>
+              <a:rPr lang="en-GB" sz="1800" dirty="0"/>
+              <a:t/>
+            </a:r>
+            <a:br>
+              <a:rPr lang="en-GB" sz="1800" dirty="0"/>
+            </a:br>
+            <a:endParaRPr lang="en-GB" sz="1800" dirty="0" smtClean="0"/>
+          </a:p>
+        </p:txBody>
+      </p:sp>
+    </p:spTree>
+    <p:extLst>
+      <p:ext uri="{BB962C8B-B14F-4D97-AF65-F5344CB8AC3E}">
+        <p14:creationId xmlns:p14="http://schemas.microsoft.com/office/powerpoint/2010/main" val="2217136417"/>
+      </p:ext>
+    </p:extLst>
+  </p:cSld>
+  <p:clrMapOvr>
+    <a:masterClrMapping/>
+  </p:clrMapOvr>
+</p:sld>
+</file>
+
+<file path=ppt/slides/slide21.xml><?xml version="1.0" encoding="utf-8"?>
+<p:sld xmlns:a="http://schemas.openxmlformats.org/drawingml/2006/main" xmlns:r="http://schemas.openxmlformats.org/officeDocument/2006/relationships" xmlns:p="http://schemas.openxmlformats.org/presentationml/2006/main">
+  <p:cSld>
+    <p:spTree>
+      <p:nvGrpSpPr>
+        <p:cNvPr id="1" name=""/>
+        <p:cNvGrpSpPr/>
+        <p:nvPr/>
+      </p:nvGrpSpPr>
+      <p:grpSpPr>
+        <a:xfrm>
+          <a:off x="0" y="0"/>
+          <a:ext cx="0" cy="0"/>
+          <a:chOff x="0" y="0"/>
+          <a:chExt cx="0" cy="0"/>
+        </a:xfrm>
+      </p:grpSpPr>
+      <p:sp>
+        <p:nvSpPr>
+          <p:cNvPr id="2" name="Titel 1"/>
+          <p:cNvSpPr>
+            <a:spLocks noGrp="1"/>
+          </p:cNvSpPr>
+          <p:nvPr>
+            <p:ph type="title"/>
+          </p:nvPr>
+        </p:nvSpPr>
+        <p:spPr>
+          <a:xfrm>
+            <a:off x="457200" y="44624"/>
+            <a:ext cx="8229600" cy="1143000"/>
+          </a:xfrm>
+        </p:spPr>
+        <p:txBody>
+          <a:bodyPr>
+            <a:normAutofit fontScale="90000"/>
+          </a:bodyPr>
+          <a:lstStyle/>
+          <a:p>
+            <a:r>
+              <a:rPr lang="en-GB" sz="3600" smtClean="0"/>
+              <a:t>Solution1: relation between temporal extended TQCs holds for </a:t>
+            </a:r>
+            <a:r>
+              <a:rPr lang="en-GB" sz="3600" smtClean="0">
+                <a:solidFill>
+                  <a:srgbClr val="FF0000"/>
+                </a:solidFill>
+              </a:rPr>
+              <a:t>all</a:t>
+            </a:r>
+            <a:r>
+              <a:rPr lang="en-GB" sz="3600" smtClean="0"/>
+              <a:t> included TQCs</a:t>
+            </a:r>
+            <a:endParaRPr lang="en-GB" sz="3600"/>
+          </a:p>
+        </p:txBody>
+      </p:sp>
+      <p:sp>
+        <p:nvSpPr>
+          <p:cNvPr id="3" name="Inhaltsplatzhalter 2"/>
+          <p:cNvSpPr>
+            <a:spLocks noGrp="1"/>
+          </p:cNvSpPr>
+          <p:nvPr>
+            <p:ph idx="1"/>
+          </p:nvPr>
+        </p:nvSpPr>
+        <p:spPr>
+          <a:xfrm>
+            <a:off x="457200" y="1268760"/>
+            <a:ext cx="8435280" cy="5328592"/>
+          </a:xfrm>
+        </p:spPr>
+        <p:txBody>
+          <a:bodyPr>
+            <a:noAutofit/>
+          </a:bodyPr>
+          <a:lstStyle/>
+          <a:p>
+            <a:r>
+              <a:rPr lang="en-GB" sz="2400" dirty="0" smtClean="0"/>
+              <a:t>for the TQCs </a:t>
+            </a:r>
+            <a:r>
+              <a:rPr lang="en-GB" sz="2400" b="1" dirty="0" smtClean="0"/>
+              <a:t>a </a:t>
+            </a:r>
+            <a:r>
+              <a:rPr lang="en-GB" sz="2400" dirty="0" smtClean="0"/>
+              <a:t>and </a:t>
+            </a:r>
+            <a:r>
+              <a:rPr lang="en-GB" sz="2400" b="1" dirty="0" smtClean="0"/>
+              <a:t>b </a:t>
+            </a:r>
+            <a:r>
+              <a:rPr lang="en-GB" sz="2400" dirty="0" smtClean="0"/>
+              <a:t>that span over </a:t>
+            </a:r>
+            <a:r>
+              <a:rPr lang="en-GB" sz="2400" b="1" dirty="0" smtClean="0"/>
+              <a:t>t</a:t>
+            </a:r>
+            <a:r>
+              <a:rPr lang="en-GB" sz="2400" dirty="0" smtClean="0"/>
+              <a:t>, related by </a:t>
+            </a:r>
+            <a:r>
+              <a:rPr lang="en-GB" sz="2400" b="1" dirty="0" err="1" smtClean="0"/>
+              <a:t>rel</a:t>
+            </a:r>
+            <a:r>
+              <a:rPr lang="en-GB" sz="2400" dirty="0" smtClean="0"/>
+              <a:t>:</a:t>
+            </a:r>
+            <a:br>
+              <a:rPr lang="en-GB" sz="2400" dirty="0" smtClean="0"/>
+            </a:br>
+            <a:r>
+              <a:rPr lang="en-GB" sz="2400" dirty="0" smtClean="0"/>
+              <a:t>for every </a:t>
+            </a:r>
+            <a:r>
+              <a:rPr lang="en-GB" sz="2400" b="1" dirty="0" smtClean="0"/>
+              <a:t>a</a:t>
+            </a:r>
+            <a:r>
+              <a:rPr lang="en-GB" sz="2400" b="1" baseline="-25000" dirty="0" smtClean="0"/>
+              <a:t>1</a:t>
+            </a:r>
+            <a:r>
+              <a:rPr lang="en-GB" sz="2400" b="1" dirty="0" smtClean="0"/>
+              <a:t> </a:t>
+            </a:r>
+            <a:r>
+              <a:rPr lang="en-GB" sz="2400" dirty="0" smtClean="0"/>
+              <a:t>which is a sibling of </a:t>
+            </a:r>
+            <a:r>
+              <a:rPr lang="en-GB" sz="2400" b="1" dirty="0" smtClean="0"/>
+              <a:t>a</a:t>
+            </a:r>
+            <a:r>
+              <a:rPr lang="en-GB" sz="2400" dirty="0" smtClean="0"/>
+              <a:t> and which spans over </a:t>
+            </a:r>
+            <a:r>
+              <a:rPr lang="en-GB" sz="2400" b="1" dirty="0" smtClean="0"/>
+              <a:t>t</a:t>
+            </a:r>
+            <a:r>
+              <a:rPr lang="en-GB" sz="2400" b="1" baseline="-25000" dirty="0" smtClean="0"/>
+              <a:t>1</a:t>
+            </a:r>
+            <a:r>
+              <a:rPr lang="en-GB" sz="2400" dirty="0" smtClean="0"/>
+              <a:t>, which is included in </a:t>
+            </a:r>
+            <a:r>
+              <a:rPr lang="en-GB" sz="2400" b="1" dirty="0" smtClean="0"/>
+              <a:t>t</a:t>
+            </a:r>
+            <a:r>
+              <a:rPr lang="en-GB" sz="2400" dirty="0" smtClean="0"/>
+              <a:t>, there is some </a:t>
+            </a:r>
+            <a:r>
+              <a:rPr lang="en-GB" sz="2400" b="1" dirty="0" smtClean="0"/>
+              <a:t>b</a:t>
+            </a:r>
+            <a:r>
+              <a:rPr lang="en-GB" sz="2400" b="1" baseline="-25000" dirty="0" smtClean="0"/>
+              <a:t>1</a:t>
+            </a:r>
+            <a:r>
+              <a:rPr lang="en-GB" sz="2400" dirty="0" smtClean="0"/>
+              <a:t> related that spans over the same </a:t>
+            </a:r>
+            <a:r>
+              <a:rPr lang="en-GB" sz="2400" b="1" dirty="0" smtClean="0"/>
+              <a:t>t</a:t>
+            </a:r>
+            <a:r>
+              <a:rPr lang="en-GB" sz="2400" b="1" baseline="-25000" dirty="0" smtClean="0"/>
+              <a:t>1</a:t>
+            </a:r>
+          </a:p>
+          <a:p>
+            <a:r>
+              <a:rPr lang="en-GB" sz="2400" dirty="0" smtClean="0"/>
+              <a:t>Drawback of this solution: generic permanent relatedness no longer expressible. </a:t>
+            </a:r>
+          </a:p>
+          <a:p>
+            <a:r>
+              <a:rPr lang="en-GB" sz="2400" dirty="0" smtClean="0"/>
+              <a:t>Example: </a:t>
+            </a:r>
+            <a:r>
+              <a:rPr lang="en-GB" sz="2400" i="1" dirty="0" smtClean="0"/>
+              <a:t>Human</a:t>
+            </a:r>
+            <a:r>
+              <a:rPr lang="en-GB" sz="2400" dirty="0" smtClean="0"/>
+              <a:t> </a:t>
+            </a:r>
+            <a:r>
+              <a:rPr lang="en-GB" sz="2400" b="1" dirty="0" err="1" smtClean="0"/>
+              <a:t>hasContinuantPart</a:t>
+            </a:r>
+            <a:r>
+              <a:rPr lang="en-GB" sz="2400" b="1" dirty="0" smtClean="0"/>
+              <a:t> </a:t>
+            </a:r>
+            <a:r>
+              <a:rPr lang="en-GB" sz="2400" dirty="0" smtClean="0"/>
+              <a:t>some </a:t>
+            </a:r>
+            <a:r>
+              <a:rPr lang="en-GB" sz="2400" i="1" dirty="0" err="1" smtClean="0"/>
+              <a:t>BloodCell</a:t>
+            </a:r>
+            <a:r>
+              <a:rPr lang="en-GB" sz="2400" i="1" dirty="0" smtClean="0"/>
+              <a:t/>
+            </a:r>
+            <a:br>
+              <a:rPr lang="en-GB" sz="2400" i="1" dirty="0" smtClean="0"/>
+            </a:br>
+            <a:r>
+              <a:rPr lang="en-GB" sz="2400" dirty="0" smtClean="0"/>
+              <a:t>As the class </a:t>
+            </a:r>
+            <a:r>
+              <a:rPr lang="en-GB" sz="2400" i="1" dirty="0" smtClean="0"/>
+              <a:t>Human</a:t>
+            </a:r>
+            <a:r>
+              <a:rPr lang="en-GB" sz="2400" dirty="0" smtClean="0"/>
+              <a:t> has all TQCs of all humans as members, it also includes the instance </a:t>
+            </a:r>
+            <a:r>
+              <a:rPr lang="en-GB" sz="2400" b="1" dirty="0" err="1" smtClean="0"/>
+              <a:t>Stefan@max</a:t>
+            </a:r>
+            <a:r>
+              <a:rPr lang="en-GB" sz="2400" dirty="0" smtClean="0"/>
+              <a:t>. None of my blood cells has the same timespan, therefore the universal quantification would no longer hold.</a:t>
+            </a:r>
+          </a:p>
+          <a:p>
+            <a:r>
+              <a:rPr lang="en-GB" sz="2400" dirty="0" smtClean="0"/>
+              <a:t>As we understand TQCs as </a:t>
+            </a:r>
+            <a:r>
+              <a:rPr lang="en-GB" sz="2400" dirty="0" err="1" smtClean="0"/>
+              <a:t>façon</a:t>
+            </a:r>
+            <a:r>
+              <a:rPr lang="en-GB" sz="2400" dirty="0" smtClean="0"/>
+              <a:t> de </a:t>
+            </a:r>
+            <a:r>
+              <a:rPr lang="en-GB" sz="2400" dirty="0" err="1" smtClean="0"/>
+              <a:t>parler</a:t>
+            </a:r>
+            <a:r>
+              <a:rPr lang="en-GB" sz="2400" dirty="0" smtClean="0"/>
+              <a:t>, it is questionable whether this strict interpretation is really meant when we refer to a continuant in a temporal context</a:t>
+            </a:r>
+          </a:p>
+          <a:p>
+            <a:pPr marL="0" indent="0">
+              <a:buNone/>
+            </a:pPr>
+            <a:r>
+              <a:rPr lang="en-GB" sz="2400" dirty="0" smtClean="0"/>
+              <a:t/>
+            </a:r>
+            <a:br>
+              <a:rPr lang="en-GB" sz="2400" dirty="0" smtClean="0"/>
+            </a:br>
+            <a:r>
+              <a:rPr lang="en-GB" sz="2400" dirty="0" smtClean="0"/>
+              <a:t/>
+            </a:r>
+            <a:br>
+              <a:rPr lang="en-GB" sz="2400" dirty="0" smtClean="0"/>
+            </a:br>
+            <a:r>
+              <a:rPr lang="en-GB" sz="2400" dirty="0" smtClean="0"/>
+              <a:t> </a:t>
+            </a:r>
+            <a:br>
+              <a:rPr lang="en-GB" sz="2400" dirty="0" smtClean="0"/>
+            </a:br>
+            <a:r>
+              <a:rPr lang="en-GB" sz="1800" dirty="0" smtClean="0"/>
+              <a:t/>
+            </a:r>
+            <a:br>
+              <a:rPr lang="en-GB" sz="1800" dirty="0" smtClean="0"/>
+            </a:br>
+            <a:r>
+              <a:rPr lang="en-GB" sz="1800" dirty="0" smtClean="0"/>
+              <a:t/>
+            </a:r>
+            <a:br>
+              <a:rPr lang="en-GB" sz="1800" dirty="0" smtClean="0"/>
+            </a:br>
+            <a:endParaRPr lang="en-GB" sz="1800" dirty="0" smtClean="0"/>
+          </a:p>
+        </p:txBody>
+      </p:sp>
+    </p:spTree>
+    <p:extLst>
+      <p:ext uri="{BB962C8B-B14F-4D97-AF65-F5344CB8AC3E}">
+        <p14:creationId xmlns:p14="http://schemas.microsoft.com/office/powerpoint/2010/main" val="2407211768"/>
+      </p:ext>
+    </p:extLst>
+  </p:cSld>
+  <p:clrMapOvr>
+    <a:masterClrMapping/>
+  </p:clrMapOvr>
+</p:sld>
+</file>
+
+<file path=ppt/slides/slide22.xml><?xml version="1.0" encoding="utf-8"?>
+<p:sld xmlns:a="http://schemas.openxmlformats.org/drawingml/2006/main" xmlns:r="http://schemas.openxmlformats.org/officeDocument/2006/relationships" xmlns:p="http://schemas.openxmlformats.org/presentationml/2006/main">
+  <p:cSld>
+    <p:spTree>
+      <p:nvGrpSpPr>
+        <p:cNvPr id="1" name=""/>
+        <p:cNvGrpSpPr/>
+        <p:nvPr/>
+      </p:nvGrpSpPr>
+      <p:grpSpPr>
+        <a:xfrm>
+          <a:off x="0" y="0"/>
+          <a:ext cx="0" cy="0"/>
+          <a:chOff x="0" y="0"/>
+          <a:chExt cx="0" cy="0"/>
+        </a:xfrm>
+      </p:grpSpPr>
+      <p:sp>
+        <p:nvSpPr>
+          <p:cNvPr id="2" name="Titel 1"/>
+          <p:cNvSpPr>
+            <a:spLocks noGrp="1"/>
+          </p:cNvSpPr>
+          <p:nvPr>
+            <p:ph type="title"/>
+          </p:nvPr>
+        </p:nvSpPr>
+        <p:spPr>
+          <a:xfrm>
+            <a:off x="457200" y="44624"/>
+            <a:ext cx="8229600" cy="1143000"/>
+          </a:xfrm>
+        </p:spPr>
+        <p:txBody>
+          <a:bodyPr>
+            <a:normAutofit fontScale="90000"/>
+          </a:bodyPr>
+          <a:lstStyle/>
+          <a:p>
+            <a:r>
+              <a:rPr lang="en-GB" sz="3600" dirty="0" smtClean="0"/>
+              <a:t>Solution2: relation between temporal extended TQCs holds for </a:t>
+            </a:r>
+            <a:r>
+              <a:rPr lang="en-GB" sz="3600" dirty="0" smtClean="0">
+                <a:solidFill>
+                  <a:srgbClr val="FF0000"/>
+                </a:solidFill>
+              </a:rPr>
+              <a:t>some</a:t>
+            </a:r>
+            <a:r>
+              <a:rPr lang="en-GB" sz="3600" dirty="0" smtClean="0"/>
+              <a:t> included TQC</a:t>
+            </a:r>
+            <a:endParaRPr lang="en-GB" sz="3600" dirty="0"/>
+          </a:p>
+        </p:txBody>
+      </p:sp>
+      <p:sp>
+        <p:nvSpPr>
+          <p:cNvPr id="3" name="Inhaltsplatzhalter 2"/>
+          <p:cNvSpPr>
+            <a:spLocks noGrp="1"/>
+          </p:cNvSpPr>
+          <p:nvPr>
+            <p:ph idx="1"/>
+          </p:nvPr>
+        </p:nvSpPr>
+        <p:spPr>
+          <a:xfrm>
+            <a:off x="457200" y="1268760"/>
+            <a:ext cx="8686800" cy="5328592"/>
+          </a:xfrm>
+        </p:spPr>
+        <p:txBody>
+          <a:bodyPr>
+            <a:noAutofit/>
+          </a:bodyPr>
+          <a:lstStyle/>
+          <a:p>
+            <a:r>
+              <a:rPr lang="en-GB" sz="2400" dirty="0" smtClean="0"/>
+              <a:t>for the TQCs </a:t>
+            </a:r>
+            <a:r>
+              <a:rPr lang="en-GB" sz="2400" b="1" dirty="0" smtClean="0"/>
+              <a:t>a </a:t>
+            </a:r>
+            <a:r>
+              <a:rPr lang="en-GB" sz="2400" dirty="0" smtClean="0"/>
+              <a:t>and </a:t>
+            </a:r>
+            <a:r>
+              <a:rPr lang="en-GB" sz="2400" b="1" dirty="0" smtClean="0"/>
+              <a:t>b </a:t>
+            </a:r>
+            <a:r>
+              <a:rPr lang="en-GB" sz="2400" dirty="0" smtClean="0"/>
+              <a:t>that span over </a:t>
+            </a:r>
+            <a:r>
+              <a:rPr lang="en-GB" sz="2400" b="1" dirty="0" smtClean="0"/>
+              <a:t>t</a:t>
+            </a:r>
+            <a:r>
+              <a:rPr lang="en-GB" sz="2400" dirty="0" smtClean="0"/>
+              <a:t>, related by </a:t>
+            </a:r>
+            <a:r>
+              <a:rPr lang="en-GB" sz="2400" b="1" dirty="0" err="1" smtClean="0"/>
+              <a:t>rel</a:t>
+            </a:r>
+            <a:r>
+              <a:rPr lang="en-GB" sz="2400" dirty="0" smtClean="0"/>
+              <a:t>:</a:t>
+            </a:r>
+            <a:br>
+              <a:rPr lang="en-GB" sz="2400" dirty="0" smtClean="0"/>
+            </a:br>
+            <a:r>
+              <a:rPr lang="en-GB" sz="2400" dirty="0" smtClean="0"/>
+              <a:t>for some </a:t>
+            </a:r>
+            <a:r>
+              <a:rPr lang="en-GB" sz="2400" b="1" dirty="0" smtClean="0"/>
+              <a:t>a</a:t>
+            </a:r>
+            <a:r>
+              <a:rPr lang="en-GB" sz="2400" b="1" baseline="-25000" dirty="0" smtClean="0"/>
+              <a:t>1</a:t>
+            </a:r>
+            <a:r>
+              <a:rPr lang="en-GB" sz="2400" b="1" dirty="0" smtClean="0"/>
+              <a:t> </a:t>
+            </a:r>
+            <a:r>
+              <a:rPr lang="en-GB" sz="2400" dirty="0" smtClean="0"/>
+              <a:t>which is a non-time-extended sibling of </a:t>
+            </a:r>
+            <a:r>
+              <a:rPr lang="en-GB" sz="2400" b="1" dirty="0" smtClean="0"/>
+              <a:t>a</a:t>
+            </a:r>
+            <a:r>
+              <a:rPr lang="en-GB" sz="2400" dirty="0" smtClean="0"/>
+              <a:t> and which spans over the time point (minimal time interval) </a:t>
+            </a:r>
+            <a:r>
+              <a:rPr lang="en-GB" sz="2400" b="1" dirty="0" smtClean="0"/>
+              <a:t>t</a:t>
+            </a:r>
+            <a:r>
+              <a:rPr lang="en-GB" sz="2400" b="1" baseline="-25000" dirty="0" smtClean="0"/>
+              <a:t>1</a:t>
+            </a:r>
+            <a:r>
+              <a:rPr lang="en-GB" sz="2400" dirty="0" smtClean="0"/>
+              <a:t>, which is included in </a:t>
+            </a:r>
+            <a:r>
+              <a:rPr lang="en-GB" sz="2400" b="1" dirty="0" smtClean="0"/>
+              <a:t>t</a:t>
+            </a:r>
+            <a:r>
+              <a:rPr lang="en-GB" sz="2400" dirty="0" smtClean="0"/>
+              <a:t>, there is some </a:t>
+            </a:r>
+            <a:r>
+              <a:rPr lang="en-GB" sz="2400" b="1" dirty="0" smtClean="0"/>
+              <a:t>b</a:t>
+            </a:r>
+            <a:r>
+              <a:rPr lang="en-GB" sz="2400" b="1" baseline="-25000" dirty="0" smtClean="0"/>
+              <a:t>1</a:t>
+            </a:r>
+            <a:r>
+              <a:rPr lang="en-GB" sz="2400" dirty="0" smtClean="0"/>
+              <a:t> related that spans over the same </a:t>
+            </a:r>
+            <a:r>
+              <a:rPr lang="en-GB" sz="2400" b="1" dirty="0" smtClean="0"/>
+              <a:t>t</a:t>
+            </a:r>
+            <a:r>
+              <a:rPr lang="en-GB" sz="2400" b="1" baseline="-25000" dirty="0" smtClean="0"/>
+              <a:t>1</a:t>
+            </a:r>
+          </a:p>
+          <a:p>
+            <a:r>
+              <a:rPr lang="en-GB" sz="2400" dirty="0" smtClean="0"/>
+              <a:t>Example: </a:t>
+            </a:r>
+            <a:r>
+              <a:rPr lang="en-GB" sz="2400" i="1" dirty="0" smtClean="0"/>
+              <a:t>Human</a:t>
+            </a:r>
+            <a:r>
+              <a:rPr lang="en-GB" sz="2400" dirty="0" smtClean="0"/>
+              <a:t> </a:t>
+            </a:r>
+            <a:r>
+              <a:rPr lang="en-GB" sz="2400" b="1" dirty="0" err="1" smtClean="0"/>
+              <a:t>hasContinuantPart</a:t>
+            </a:r>
+            <a:r>
+              <a:rPr lang="en-GB" sz="2400" b="1" dirty="0" smtClean="0"/>
+              <a:t> </a:t>
+            </a:r>
+            <a:r>
+              <a:rPr lang="en-GB" sz="2400" dirty="0" smtClean="0"/>
+              <a:t>some </a:t>
+            </a:r>
+            <a:r>
+              <a:rPr lang="en-GB" sz="2400" i="1" dirty="0" err="1" smtClean="0"/>
+              <a:t>BloodCell</a:t>
+            </a:r>
+            <a:r>
+              <a:rPr lang="en-GB" sz="2400" i="1" dirty="0" smtClean="0"/>
+              <a:t/>
+            </a:r>
+            <a:br>
+              <a:rPr lang="en-GB" sz="2400" i="1" dirty="0" smtClean="0"/>
+            </a:br>
+            <a:r>
+              <a:rPr lang="en-GB" sz="2400" dirty="0" smtClean="0"/>
+              <a:t>As the class </a:t>
+            </a:r>
+            <a:r>
+              <a:rPr lang="en-GB" sz="2400" i="1" dirty="0" smtClean="0"/>
+              <a:t>Human</a:t>
+            </a:r>
+            <a:r>
+              <a:rPr lang="en-GB" sz="2400" dirty="0" smtClean="0"/>
+              <a:t> has all TQCs of all humans as members, it also includes the instance </a:t>
+            </a:r>
+            <a:r>
+              <a:rPr lang="en-GB" sz="2400" b="1" dirty="0" err="1" smtClean="0"/>
+              <a:t>Stefan@max</a:t>
+            </a:r>
+            <a:r>
+              <a:rPr lang="en-GB" sz="2400" dirty="0" smtClean="0"/>
+              <a:t>. There is a given t1 within the extension of my life, where there is the parthood relation holds between me a this blood cell. As this can be said about all TQCs of all humans, the </a:t>
+            </a:r>
+            <a:r>
+              <a:rPr lang="en-GB" sz="2400" dirty="0"/>
+              <a:t>generic permanent </a:t>
+            </a:r>
+            <a:r>
+              <a:rPr lang="en-GB" sz="2400" dirty="0" smtClean="0"/>
+              <a:t>relatedness can be asserted</a:t>
+            </a:r>
+          </a:p>
+          <a:p>
+            <a:r>
+              <a:rPr lang="en-GB" sz="2400" dirty="0" smtClean="0"/>
+              <a:t>Drawback: there is no easy way to express that a relation between a given pair of instances holds constantly during an extended time span, which would be important to detect contradictions like in the Graz / Mannheim example.</a:t>
+            </a:r>
+          </a:p>
+          <a:p>
+            <a:endParaRPr lang="en-GB" sz="2400" dirty="0" smtClean="0"/>
+          </a:p>
+          <a:p>
+            <a:pPr marL="0" indent="0">
+              <a:buNone/>
+            </a:pPr>
+            <a:r>
+              <a:rPr lang="en-GB" sz="2400" dirty="0" smtClean="0"/>
+              <a:t/>
+            </a:r>
+            <a:br>
+              <a:rPr lang="en-GB" sz="2400" dirty="0" smtClean="0"/>
+            </a:br>
+            <a:r>
+              <a:rPr lang="en-GB" sz="2400" dirty="0" smtClean="0"/>
+              <a:t/>
+            </a:r>
+            <a:br>
+              <a:rPr lang="en-GB" sz="2400" dirty="0" smtClean="0"/>
+            </a:br>
+            <a:r>
+              <a:rPr lang="en-GB" sz="2400" dirty="0" smtClean="0"/>
+              <a:t> </a:t>
+            </a:r>
+            <a:br>
+              <a:rPr lang="en-GB" sz="2400" dirty="0" smtClean="0"/>
+            </a:br>
+            <a:r>
+              <a:rPr lang="en-GB" sz="1800" dirty="0" smtClean="0"/>
+              <a:t/>
+            </a:r>
+            <a:br>
+              <a:rPr lang="en-GB" sz="1800" dirty="0" smtClean="0"/>
+            </a:br>
+            <a:r>
+              <a:rPr lang="en-GB" sz="1800" dirty="0"/>
+              <a:t/>
+            </a:r>
+            <a:br>
+              <a:rPr lang="en-GB" sz="1800" dirty="0"/>
+            </a:br>
+            <a:endParaRPr lang="en-GB" sz="1800" dirty="0" smtClean="0"/>
+          </a:p>
+        </p:txBody>
+      </p:sp>
+    </p:spTree>
+    <p:extLst>
+      <p:ext uri="{BB962C8B-B14F-4D97-AF65-F5344CB8AC3E}">
+        <p14:creationId xmlns:p14="http://schemas.microsoft.com/office/powerpoint/2010/main" val="3491687021"/>
+      </p:ext>
+    </p:extLst>
+  </p:cSld>
+  <p:clrMapOvr>
+    <a:masterClrMapping/>
+  </p:clrMapOvr>
+</p:sld>
+</file>
+
+<file path=ppt/slides/slide23.xml><?xml version="1.0" encoding="utf-8"?>
+<p:sld xmlns:a="http://schemas.openxmlformats.org/drawingml/2006/main" xmlns:r="http://schemas.openxmlformats.org/officeDocument/2006/relationships" xmlns:p="http://schemas.openxmlformats.org/presentationml/2006/main">
+  <p:cSld>
+    <p:spTree>
+      <p:nvGrpSpPr>
+        <p:cNvPr id="1" name=""/>
+        <p:cNvGrpSpPr/>
+        <p:nvPr/>
+      </p:nvGrpSpPr>
+      <p:grpSpPr>
+        <a:xfrm>
+          <a:off x="0" y="0"/>
+          <a:ext cx="0" cy="0"/>
+          <a:chOff x="0" y="0"/>
+          <a:chExt cx="0" cy="0"/>
+        </a:xfrm>
+      </p:grpSpPr>
+      <p:sp>
+        <p:nvSpPr>
+          <p:cNvPr id="2" name="Titel 1"/>
+          <p:cNvSpPr>
+            <a:spLocks noGrp="1"/>
+          </p:cNvSpPr>
+          <p:nvPr>
+            <p:ph type="title"/>
+          </p:nvPr>
+        </p:nvSpPr>
+        <p:spPr>
+          <a:xfrm>
+            <a:off x="457200" y="44624"/>
+            <a:ext cx="8229600" cy="1143000"/>
+          </a:xfrm>
+        </p:spPr>
+        <p:txBody>
+          <a:bodyPr>
+            <a:normAutofit fontScale="90000"/>
+          </a:bodyPr>
+          <a:lstStyle/>
+          <a:p>
+            <a:r>
+              <a:rPr lang="en-GB" sz="3600" dirty="0" smtClean="0"/>
+              <a:t>Solution3: differentiation between "rigid" and "non-rigid" relatedness</a:t>
+            </a:r>
+            <a:endParaRPr lang="en-GB" sz="3600" dirty="0"/>
+          </a:p>
+        </p:txBody>
+      </p:sp>
+      <p:sp>
+        <p:nvSpPr>
+          <p:cNvPr id="3" name="Inhaltsplatzhalter 2"/>
+          <p:cNvSpPr>
+            <a:spLocks noGrp="1"/>
+          </p:cNvSpPr>
+          <p:nvPr>
+            <p:ph idx="1"/>
+          </p:nvPr>
+        </p:nvSpPr>
+        <p:spPr>
+          <a:xfrm>
+            <a:off x="457200" y="1268760"/>
+            <a:ext cx="8686800" cy="5328592"/>
+          </a:xfrm>
+        </p:spPr>
+        <p:txBody>
+          <a:bodyPr vert="horz" lIns="91440" tIns="45720" rIns="91440" bIns="45720" rtlCol="0">
+            <a:noAutofit/>
+          </a:bodyPr>
+          <a:lstStyle/>
+          <a:p>
+            <a:r>
+              <a:rPr lang="en-GB" sz="2400" dirty="0"/>
+              <a:t>It should be possible to distinguish between statements of the </a:t>
+            </a:r>
+            <a:r>
+              <a:rPr lang="en-GB" sz="2400" dirty="0" smtClean="0"/>
+              <a:t>kind</a:t>
+            </a:r>
+          </a:p>
+          <a:p>
+            <a:pPr lvl="1"/>
+            <a:r>
+              <a:rPr lang="en-GB" sz="2000" b="1" dirty="0" smtClean="0"/>
+              <a:t>a</a:t>
+            </a:r>
+            <a:r>
+              <a:rPr lang="en-GB" sz="2000" dirty="0" smtClean="0"/>
+              <a:t> </a:t>
+            </a:r>
+            <a:r>
+              <a:rPr lang="en-GB" sz="2000" dirty="0"/>
+              <a:t>is related to </a:t>
+            </a:r>
+            <a:r>
+              <a:rPr lang="en-GB" sz="2000" b="1" dirty="0" smtClean="0"/>
+              <a:t>b</a:t>
+            </a:r>
+            <a:r>
+              <a:rPr lang="en-GB" sz="2000" dirty="0" smtClean="0"/>
+              <a:t> </a:t>
+            </a:r>
+            <a:r>
+              <a:rPr lang="en-GB" sz="2000" dirty="0"/>
+              <a:t>at the exact time </a:t>
+            </a:r>
+            <a:r>
+              <a:rPr lang="en-GB" sz="2000" dirty="0" smtClean="0"/>
+              <a:t>interval </a:t>
+            </a:r>
+            <a:r>
+              <a:rPr lang="en-GB" sz="2000" b="1" dirty="0" smtClean="0"/>
+              <a:t>t </a:t>
+            </a:r>
+            <a:r>
+              <a:rPr lang="en-GB" sz="2000" dirty="0" smtClean="0"/>
+              <a:t>("rigid")</a:t>
+            </a:r>
+          </a:p>
+          <a:p>
+            <a:pPr lvl="1"/>
+            <a:r>
+              <a:rPr lang="en-GB" sz="2000" b="1" dirty="0" smtClean="0"/>
+              <a:t>a</a:t>
+            </a:r>
+            <a:r>
+              <a:rPr lang="en-GB" sz="2000" dirty="0" smtClean="0"/>
+              <a:t> </a:t>
+            </a:r>
+            <a:r>
+              <a:rPr lang="en-GB" sz="2000" dirty="0"/>
+              <a:t>is related to </a:t>
+            </a:r>
+            <a:r>
+              <a:rPr lang="en-GB" sz="2000" b="1" dirty="0"/>
+              <a:t>b</a:t>
+            </a:r>
+            <a:r>
+              <a:rPr lang="en-GB" sz="2000" dirty="0"/>
+              <a:t> at </a:t>
+            </a:r>
+            <a:r>
+              <a:rPr lang="en-GB" sz="2000" dirty="0" smtClean="0"/>
+              <a:t>some time during the </a:t>
+            </a:r>
+            <a:r>
+              <a:rPr lang="en-GB" sz="2000" dirty="0"/>
+              <a:t>exact time interval </a:t>
+            </a:r>
+            <a:r>
+              <a:rPr lang="en-GB" sz="2000" b="1" dirty="0" smtClean="0"/>
+              <a:t>t </a:t>
+            </a:r>
+            <a:r>
+              <a:rPr lang="en-GB" sz="2000" dirty="0" smtClean="0"/>
+              <a:t>("non-rigid</a:t>
+            </a:r>
+            <a:r>
+              <a:rPr lang="en-GB" sz="2000" dirty="0"/>
+              <a:t>")</a:t>
+            </a:r>
+          </a:p>
+          <a:p>
+            <a:r>
+              <a:rPr lang="en-GB" sz="2400" dirty="0" smtClean="0"/>
+              <a:t>rigidness between "max" entities could then be used to distinguish permanent specific from permanent generic</a:t>
+            </a:r>
+          </a:p>
+          <a:p>
+            <a:r>
+              <a:rPr lang="en-GB" sz="2400" dirty="0" smtClean="0"/>
+              <a:t>to be better elaborated</a:t>
+            </a:r>
+          </a:p>
+          <a:p>
+            <a:r>
+              <a:rPr lang="en-GB" sz="2400" dirty="0" smtClean="0"/>
+              <a:t>possible drawback: complicated models</a:t>
+            </a:r>
+            <a:br>
+              <a:rPr lang="en-GB" sz="2400" dirty="0" smtClean="0"/>
+            </a:br>
+            <a:r>
+              <a:rPr lang="en-GB" sz="2400" dirty="0" smtClean="0"/>
+              <a:t/>
+            </a:r>
+            <a:br>
+              <a:rPr lang="en-GB" sz="2400" dirty="0" smtClean="0"/>
+            </a:br>
+            <a:r>
+              <a:rPr lang="en-GB" sz="2400" dirty="0" smtClean="0"/>
+              <a:t> </a:t>
+            </a:r>
+            <a:br>
+              <a:rPr lang="en-GB" sz="2400" dirty="0" smtClean="0"/>
+            </a:br>
+            <a:r>
+              <a:rPr lang="en-GB" sz="2400" dirty="0" smtClean="0"/>
+              <a:t/>
+            </a:r>
+            <a:br>
+              <a:rPr lang="en-GB" sz="2400" dirty="0" smtClean="0"/>
+            </a:br>
+            <a:r>
+              <a:rPr lang="en-GB" sz="2400" dirty="0" smtClean="0"/>
+              <a:t/>
+            </a:r>
+            <a:br>
+              <a:rPr lang="en-GB" sz="2400" dirty="0" smtClean="0"/>
+            </a:br>
+            <a:endParaRPr lang="en-GB" sz="2400" dirty="0"/>
+          </a:p>
+        </p:txBody>
+      </p:sp>
+    </p:spTree>
+    <p:extLst>
+      <p:ext uri="{BB962C8B-B14F-4D97-AF65-F5344CB8AC3E}">
+        <p14:creationId xmlns:p14="http://schemas.microsoft.com/office/powerpoint/2010/main" val="3742432895"/>
+      </p:ext>
+    </p:extLst>
+  </p:cSld>
+  <p:clrMapOvr>
+    <a:masterClrMapping/>
+  </p:clrMapOvr>
 </p:sld>
 </file>
 

</xml_diff>